<commit_message>
documentation, names of functions
</commit_message>
<xml_diff>
--- a/cheatsheets/EIX.pptx
+++ b/cheatsheets/EIX.pptx
@@ -2218,7 +2218,7 @@
           </a:ln>
           <a:extLst>
             <a:ext uri="{C572A759-6A51-4108-AA02-DFA0A04FC94B}">
-              <ma14:wrappingTextBoxFlag xmlns="" xmlns:m="http://schemas.openxmlformats.org/officeDocument/2006/math" xmlns:a14="http://schemas.microsoft.com/office/drawing/2010/main" xmlns:ma14="http://schemas.microsoft.com/office/mac/drawingml/2011/main" val="1"/>
+              <ma14:wrappingTextBoxFlag xmlns:ma14="http://schemas.microsoft.com/office/mac/drawingml/2011/main" xmlns:a14="http://schemas.microsoft.com/office/drawing/2010/main" xmlns:m="http://schemas.openxmlformats.org/officeDocument/2006/math" xmlns="" val="1"/>
             </a:ext>
           </a:extLst>
         </p:spPr>
@@ -2257,7 +2257,7 @@
           </a:ln>
           <a:extLst>
             <a:ext uri="{C572A759-6A51-4108-AA02-DFA0A04FC94B}">
-              <ma14:wrappingTextBoxFlag xmlns="" xmlns:m="http://schemas.openxmlformats.org/officeDocument/2006/math" xmlns:a14="http://schemas.microsoft.com/office/drawing/2010/main" xmlns:ma14="http://schemas.microsoft.com/office/mac/drawingml/2011/main" val="1"/>
+              <ma14:wrappingTextBoxFlag xmlns:ma14="http://schemas.microsoft.com/office/mac/drawingml/2011/main" xmlns:a14="http://schemas.microsoft.com/office/drawing/2010/main" xmlns:m="http://schemas.openxmlformats.org/officeDocument/2006/math" xmlns="" val="1"/>
             </a:ext>
           </a:extLst>
         </p:spPr>
@@ -4359,7 +4359,7 @@
           </a:ln>
           <a:extLst>
             <a:ext uri="{C572A759-6A51-4108-AA02-DFA0A04FC94B}">
-              <ma14:wrappingTextBoxFlag xmlns="" xmlns:m="http://schemas.openxmlformats.org/officeDocument/2006/math" xmlns:a14="http://schemas.microsoft.com/office/drawing/2010/main" xmlns:ma14="http://schemas.microsoft.com/office/mac/drawingml/2011/main" val="1"/>
+              <ma14:wrappingTextBoxFlag xmlns:ma14="http://schemas.microsoft.com/office/mac/drawingml/2011/main" xmlns:a14="http://schemas.microsoft.com/office/drawing/2010/main" xmlns:m="http://schemas.openxmlformats.org/officeDocument/2006/math" xmlns="" val="1"/>
             </a:ext>
           </a:extLst>
         </p:spPr>
@@ -4749,7 +4749,7 @@
           </a:ln>
           <a:extLst>
             <a:ext uri="{C572A759-6A51-4108-AA02-DFA0A04FC94B}">
-              <ma14:wrappingTextBoxFlag xmlns="" xmlns:ma14="http://schemas.microsoft.com/office/mac/drawingml/2011/main" val="1"/>
+              <ma14:wrappingTextBoxFlag xmlns:ma14="http://schemas.microsoft.com/office/mac/drawingml/2011/main" xmlns="" val="1"/>
             </a:ext>
           </a:extLst>
         </p:spPr>
@@ -4849,7 +4849,7 @@
           </a:ln>
           <a:extLst>
             <a:ext uri="{C572A759-6A51-4108-AA02-DFA0A04FC94B}">
-              <ma14:wrappingTextBoxFlag xmlns="" xmlns:ma14="http://schemas.microsoft.com/office/mac/drawingml/2011/main" val="1"/>
+              <ma14:wrappingTextBoxFlag xmlns:ma14="http://schemas.microsoft.com/office/mac/drawingml/2011/main" xmlns="" val="1"/>
             </a:ext>
           </a:extLst>
         </p:spPr>
@@ -4997,7 +4997,7 @@
           </a:ln>
           <a:extLst>
             <a:ext uri="{C572A759-6A51-4108-AA02-DFA0A04FC94B}">
-              <ma14:wrappingTextBoxFlag xmlns="" xmlns:ma14="http://schemas.microsoft.com/office/mac/drawingml/2011/main" val="1"/>
+              <ma14:wrappingTextBoxFlag xmlns:ma14="http://schemas.microsoft.com/office/mac/drawingml/2011/main" xmlns="" val="1"/>
             </a:ext>
           </a:extLst>
         </p:spPr>
@@ -5078,7 +5078,7 @@
           </a:ln>
           <a:extLst>
             <a:ext uri="{C572A759-6A51-4108-AA02-DFA0A04FC94B}">
-              <ma14:wrappingTextBoxFlag xmlns="" xmlns:ma14="http://schemas.microsoft.com/office/mac/drawingml/2011/main" val="1"/>
+              <ma14:wrappingTextBoxFlag xmlns:ma14="http://schemas.microsoft.com/office/mac/drawingml/2011/main" xmlns="" val="1"/>
             </a:ext>
           </a:extLst>
         </p:spPr>
@@ -5193,7 +5193,7 @@
           </a:ln>
           <a:extLst>
             <a:ext uri="{C572A759-6A51-4108-AA02-DFA0A04FC94B}">
-              <ma14:wrappingTextBoxFlag xmlns="" xmlns:ma14="http://schemas.microsoft.com/office/mac/drawingml/2011/main" val="1"/>
+              <ma14:wrappingTextBoxFlag xmlns:ma14="http://schemas.microsoft.com/office/mac/drawingml/2011/main" xmlns="" val="1"/>
             </a:ext>
           </a:extLst>
         </p:spPr>
@@ -5307,7 +5307,7 @@
           </a:ln>
           <a:extLst>
             <a:ext uri="{C572A759-6A51-4108-AA02-DFA0A04FC94B}">
-              <ma14:wrappingTextBoxFlag xmlns="" xmlns:ma14="http://schemas.microsoft.com/office/mac/drawingml/2011/main" val="1"/>
+              <ma14:wrappingTextBoxFlag xmlns:ma14="http://schemas.microsoft.com/office/mac/drawingml/2011/main" xmlns="" val="1"/>
             </a:ext>
           </a:extLst>
         </p:spPr>
@@ -5425,7 +5425,7 @@
         </p:nvSpPr>
         <p:spPr>
           <a:xfrm>
-            <a:off x="543282" y="1044347"/>
+            <a:off x="569246" y="1183544"/>
             <a:ext cx="3795194" cy="1823495"/>
           </a:xfrm>
           <a:prstGeom prst="rect">
@@ -6938,7 +6938,7 @@
         </p:nvSpPr>
         <p:spPr>
           <a:xfrm>
-            <a:off x="546039" y="2934958"/>
+            <a:off x="543282" y="3290240"/>
             <a:ext cx="3795194" cy="530834"/>
           </a:xfrm>
           <a:prstGeom prst="rect">
@@ -7065,8 +7065,8 @@
         </p:nvSpPr>
         <p:spPr>
           <a:xfrm>
-            <a:off x="546038" y="3525551"/>
-            <a:ext cx="3795194" cy="1977384"/>
+            <a:off x="557627" y="4024030"/>
+            <a:ext cx="3795194" cy="1346442"/>
           </a:xfrm>
           <a:prstGeom prst="rect">
             <a:avLst/>
@@ -7122,13 +7122,31 @@
           </a:p>
           <a:p>
             <a:r>
+              <a:rPr lang="pl-PL" b="0" dirty="0" err="1">
+                <a:solidFill>
+                  <a:srgbClr val="000000"/>
+                </a:solidFill>
+                <a:latin typeface="Menlo"/>
+              </a:rPr>
+              <a:t>sm</a:t>
+            </a:r>
+            <a:r>
+              <a:rPr lang="pl-PL" b="0" dirty="0">
+                <a:solidFill>
+                  <a:srgbClr val="000000"/>
+                </a:solidFill>
+                <a:latin typeface="Menlo"/>
+              </a:rPr>
+              <a:t> &lt;- </a:t>
+            </a:r>
+            <a:r>
               <a:rPr lang="pl-PL" dirty="0" err="1">
                 <a:solidFill>
                   <a:srgbClr val="000000"/>
                 </a:solidFill>
                 <a:latin typeface="Menlo"/>
               </a:rPr>
-              <a:t>library</a:t>
+              <a:t>sparse.model.matrix</a:t>
             </a:r>
             <a:r>
               <a:rPr lang="pl-PL" b="0" dirty="0">
@@ -7137,7 +7155,7 @@
                 </a:solidFill>
                 <a:latin typeface="Menlo"/>
               </a:rPr>
-              <a:t>("</a:t>
+              <a:t>(</a:t>
             </a:r>
             <a:r>
               <a:rPr lang="pl-PL" b="0" dirty="0" err="1">
@@ -7146,7 +7164,7 @@
                 </a:solidFill>
                 <a:latin typeface="Menlo"/>
               </a:rPr>
-              <a:t>data.table</a:t>
+              <a:t>left</a:t>
             </a:r>
             <a:r>
               <a:rPr lang="pl-PL" b="0" dirty="0">
@@ -7155,7 +7173,25 @@
                 </a:solidFill>
                 <a:latin typeface="Menlo"/>
               </a:rPr>
-              <a:t>")</a:t>
+              <a:t> ~ . - 1,  data = </a:t>
+            </a:r>
+            <a:r>
+              <a:rPr lang="pl-PL" b="0" dirty="0" err="1">
+                <a:solidFill>
+                  <a:srgbClr val="000000"/>
+                </a:solidFill>
+                <a:latin typeface="Menlo"/>
+              </a:rPr>
+              <a:t>HR_data</a:t>
+            </a:r>
+            <a:r>
+              <a:rPr lang="pl-PL" b="0" dirty="0">
+                <a:solidFill>
+                  <a:srgbClr val="000000"/>
+                </a:solidFill>
+                <a:latin typeface="Menlo"/>
+              </a:rPr>
+              <a:t>)</a:t>
             </a:r>
           </a:p>
           <a:p>
@@ -7198,13 +7234,22 @@
           </a:p>
           <a:p>
             <a:r>
+              <a:rPr lang="pl-PL" b="0" dirty="0">
+                <a:solidFill>
+                  <a:srgbClr val="000000"/>
+                </a:solidFill>
+                <a:latin typeface="Menlo"/>
+              </a:rPr>
+              <a:t>param &lt;- list(</a:t>
+            </a:r>
+            <a:r>
               <a:rPr lang="pl-PL" b="0" dirty="0" err="1">
                 <a:solidFill>
                   <a:srgbClr val="000000"/>
                 </a:solidFill>
                 <a:latin typeface="Menlo"/>
               </a:rPr>
-              <a:t>dt_HR</a:t>
+              <a:t>objective</a:t>
             </a:r>
             <a:r>
               <a:rPr lang="pl-PL" b="0" dirty="0">
@@ -7213,16 +7258,16 @@
                 </a:solidFill>
                 <a:latin typeface="Menlo"/>
               </a:rPr>
-              <a:t> &lt;- </a:t>
-            </a:r>
-            <a:r>
-              <a:rPr lang="pl-PL" dirty="0" err="1">
-                <a:solidFill>
-                  <a:srgbClr val="000000"/>
-                </a:solidFill>
-                <a:latin typeface="Menlo"/>
-              </a:rPr>
-              <a:t>data.table</a:t>
+              <a:t> = "</a:t>
+            </a:r>
+            <a:r>
+              <a:rPr lang="pl-PL" b="0" dirty="0" err="1">
+                <a:solidFill>
+                  <a:srgbClr val="000000"/>
+                </a:solidFill>
+                <a:latin typeface="Menlo"/>
+              </a:rPr>
+              <a:t>binary:logistic</a:t>
             </a:r>
             <a:r>
               <a:rPr lang="pl-PL" b="0" dirty="0">
@@ -7231,7 +7276,7 @@
                 </a:solidFill>
                 <a:latin typeface="Menlo"/>
               </a:rPr>
-              <a:t>(</a:t>
+              <a:t>", </a:t>
             </a:r>
             <a:r>
               <a:rPr lang="pl-PL" b="0" dirty="0" err="1">
@@ -7240,7 +7285,7 @@
                 </a:solidFill>
                 <a:latin typeface="Menlo"/>
               </a:rPr>
-              <a:t>HR_data</a:t>
+              <a:t>max_depth</a:t>
             </a:r>
             <a:r>
               <a:rPr lang="pl-PL" b="0" dirty="0">
@@ -7249,7 +7294,7 @@
                 </a:solidFill>
                 <a:latin typeface="Menlo"/>
               </a:rPr>
-              <a:t>)</a:t>
+              <a:t> = 2)</a:t>
             </a:r>
           </a:p>
           <a:p>
@@ -7260,6 +7305,42 @@
                 </a:solidFill>
                 <a:latin typeface="Menlo"/>
               </a:rPr>
+              <a:t>xgb.model</a:t>
+            </a:r>
+            <a:r>
+              <a:rPr lang="pl-PL" b="0" dirty="0">
+                <a:solidFill>
+                  <a:srgbClr val="000000"/>
+                </a:solidFill>
+                <a:latin typeface="Menlo"/>
+              </a:rPr>
+              <a:t> &lt;- </a:t>
+            </a:r>
+            <a:r>
+              <a:rPr lang="pl-PL" dirty="0" err="1">
+                <a:solidFill>
+                  <a:srgbClr val="000000"/>
+                </a:solidFill>
+                <a:latin typeface="Menlo"/>
+              </a:rPr>
+              <a:t>xgboost</a:t>
+            </a:r>
+            <a:r>
+              <a:rPr lang="pl-PL" b="0" dirty="0">
+                <a:solidFill>
+                  <a:srgbClr val="000000"/>
+                </a:solidFill>
+                <a:latin typeface="Menlo"/>
+              </a:rPr>
+              <a:t>(</a:t>
+            </a:r>
+            <a:r>
+              <a:rPr lang="pl-PL" b="0" dirty="0" err="1">
+                <a:solidFill>
+                  <a:srgbClr val="000000"/>
+                </a:solidFill>
+                <a:latin typeface="Menlo"/>
+              </a:rPr>
               <a:t>sm</a:t>
             </a:r>
             <a:r>
@@ -7269,16 +7350,16 @@
                 </a:solidFill>
                 <a:latin typeface="Menlo"/>
               </a:rPr>
-              <a:t> &lt;- </a:t>
-            </a:r>
-            <a:r>
-              <a:rPr lang="pl-PL" dirty="0" err="1">
-                <a:solidFill>
-                  <a:srgbClr val="000000"/>
-                </a:solidFill>
-                <a:latin typeface="Menlo"/>
-              </a:rPr>
-              <a:t>sparse.model.matrix</a:t>
+              <a:t>, </a:t>
+            </a:r>
+            <a:r>
+              <a:rPr lang="pl-PL" b="0" dirty="0" err="1">
+                <a:solidFill>
+                  <a:srgbClr val="000000"/>
+                </a:solidFill>
+                <a:latin typeface="Menlo"/>
+              </a:rPr>
+              <a:t>params</a:t>
             </a:r>
             <a:r>
               <a:rPr lang="pl-PL" b="0" dirty="0">
@@ -7287,7 +7368,7 @@
                 </a:solidFill>
                 <a:latin typeface="Menlo"/>
               </a:rPr>
-              <a:t>(</a:t>
+              <a:t> = param, </a:t>
             </a:r>
             <a:r>
               <a:rPr lang="pl-PL" b="0" dirty="0" err="1">
@@ -7296,6 +7377,42 @@
                 </a:solidFill>
                 <a:latin typeface="Menlo"/>
               </a:rPr>
+              <a:t>label</a:t>
+            </a:r>
+            <a:r>
+              <a:rPr lang="pl-PL" b="0" dirty="0">
+                <a:solidFill>
+                  <a:srgbClr val="000000"/>
+                </a:solidFill>
+                <a:latin typeface="Menlo"/>
+              </a:rPr>
+              <a:t> = </a:t>
+            </a:r>
+            <a:r>
+              <a:rPr lang="pl-PL" b="0" dirty="0" err="1">
+                <a:solidFill>
+                  <a:srgbClr val="000000"/>
+                </a:solidFill>
+                <a:latin typeface="Menlo"/>
+              </a:rPr>
+              <a:t>HR_data</a:t>
+            </a:r>
+            <a:r>
+              <a:rPr lang="pl-PL" b="0" dirty="0">
+                <a:solidFill>
+                  <a:srgbClr val="000000"/>
+                </a:solidFill>
+                <a:latin typeface="Menlo"/>
+              </a:rPr>
+              <a:t>[, </a:t>
+            </a:r>
+            <a:r>
+              <a:rPr lang="pl-PL" b="0" dirty="0" err="1">
+                <a:solidFill>
+                  <a:srgbClr val="000000"/>
+                </a:solidFill>
+                <a:latin typeface="Menlo"/>
+              </a:rPr>
               <a:t>left</a:t>
             </a:r>
             <a:r>
@@ -7305,7 +7422,7 @@
                 </a:solidFill>
                 <a:latin typeface="Menlo"/>
               </a:rPr>
-              <a:t> ~ . - 1,  data = </a:t>
+              <a:t>] == 1, </a:t>
             </a:r>
             <a:r>
               <a:rPr lang="pl-PL" b="0" dirty="0" err="1">
@@ -7314,7 +7431,7 @@
                 </a:solidFill>
                 <a:latin typeface="Menlo"/>
               </a:rPr>
-              <a:t>dt_HR</a:t>
+              <a:t>nrounds</a:t>
             </a:r>
             <a:r>
               <a:rPr lang="pl-PL" b="0" dirty="0">
@@ -7323,238 +7440,7 @@
                 </a:solidFill>
                 <a:latin typeface="Menlo"/>
               </a:rPr>
-              <a:t>)</a:t>
-            </a:r>
-          </a:p>
-          <a:p>
-            <a:r>
-              <a:rPr lang="pl-PL" b="0" dirty="0">
-                <a:solidFill>
-                  <a:srgbClr val="000000"/>
-                </a:solidFill>
-                <a:latin typeface="Menlo"/>
-              </a:rPr>
-              <a:t>param &lt;- list(</a:t>
-            </a:r>
-            <a:r>
-              <a:rPr lang="pl-PL" b="0" dirty="0" err="1">
-                <a:solidFill>
-                  <a:srgbClr val="000000"/>
-                </a:solidFill>
-                <a:latin typeface="Menlo"/>
-              </a:rPr>
-              <a:t>objective</a:t>
-            </a:r>
-            <a:r>
-              <a:rPr lang="pl-PL" b="0" dirty="0">
-                <a:solidFill>
-                  <a:srgbClr val="000000"/>
-                </a:solidFill>
-                <a:latin typeface="Menlo"/>
-              </a:rPr>
-              <a:t> = "</a:t>
-            </a:r>
-            <a:r>
-              <a:rPr lang="pl-PL" b="0" dirty="0" err="1">
-                <a:solidFill>
-                  <a:srgbClr val="000000"/>
-                </a:solidFill>
-                <a:latin typeface="Menlo"/>
-              </a:rPr>
-              <a:t>binary:logistic</a:t>
-            </a:r>
-            <a:r>
-              <a:rPr lang="pl-PL" b="0" dirty="0">
-                <a:solidFill>
-                  <a:srgbClr val="000000"/>
-                </a:solidFill>
-                <a:latin typeface="Menlo"/>
-              </a:rPr>
-              <a:t>", </a:t>
-            </a:r>
-            <a:r>
-              <a:rPr lang="pl-PL" b="0" dirty="0" err="1">
-                <a:solidFill>
-                  <a:srgbClr val="000000"/>
-                </a:solidFill>
-                <a:latin typeface="Menlo"/>
-              </a:rPr>
-              <a:t>base_score</a:t>
-            </a:r>
-            <a:r>
-              <a:rPr lang="pl-PL" b="0" dirty="0">
-                <a:solidFill>
-                  <a:srgbClr val="000000"/>
-                </a:solidFill>
-                <a:latin typeface="Menlo"/>
-              </a:rPr>
-              <a:t> = 0.5, 				</a:t>
-            </a:r>
-            <a:r>
-              <a:rPr lang="pl-PL" b="0" dirty="0" err="1">
-                <a:solidFill>
-                  <a:srgbClr val="000000"/>
-                </a:solidFill>
-                <a:latin typeface="Menlo"/>
-              </a:rPr>
-              <a:t>max_depth</a:t>
-            </a:r>
-            <a:r>
-              <a:rPr lang="pl-PL" b="0" dirty="0">
-                <a:solidFill>
-                  <a:srgbClr val="000000"/>
-                </a:solidFill>
-                <a:latin typeface="Menlo"/>
-              </a:rPr>
-              <a:t> = 2)</a:t>
-            </a:r>
-          </a:p>
-          <a:p>
-            <a:r>
-              <a:rPr lang="pl-PL" b="0" dirty="0" err="1">
-                <a:solidFill>
-                  <a:srgbClr val="000000"/>
-                </a:solidFill>
-                <a:latin typeface="Menlo"/>
-              </a:rPr>
-              <a:t>xgb.model</a:t>
-            </a:r>
-            <a:r>
-              <a:rPr lang="pl-PL" b="0" dirty="0">
-                <a:solidFill>
-                  <a:srgbClr val="000000"/>
-                </a:solidFill>
-                <a:latin typeface="Menlo"/>
-              </a:rPr>
-              <a:t> &lt;- </a:t>
-            </a:r>
-            <a:r>
-              <a:rPr lang="pl-PL" dirty="0" err="1">
-                <a:solidFill>
-                  <a:srgbClr val="000000"/>
-                </a:solidFill>
-                <a:latin typeface="Menlo"/>
-              </a:rPr>
-              <a:t>xgboost</a:t>
-            </a:r>
-            <a:r>
-              <a:rPr lang="pl-PL" b="0" dirty="0">
-                <a:solidFill>
-                  <a:srgbClr val="000000"/>
-                </a:solidFill>
-                <a:latin typeface="Menlo"/>
-              </a:rPr>
-              <a:t>( param = param, data = </a:t>
-            </a:r>
-            <a:r>
-              <a:rPr lang="pl-PL" b="0" dirty="0" err="1">
-                <a:solidFill>
-                  <a:srgbClr val="000000"/>
-                </a:solidFill>
-                <a:latin typeface="Menlo"/>
-              </a:rPr>
-              <a:t>sm</a:t>
-            </a:r>
-            <a:r>
-              <a:rPr lang="pl-PL" b="0" dirty="0">
-                <a:solidFill>
-                  <a:srgbClr val="000000"/>
-                </a:solidFill>
-                <a:latin typeface="Menlo"/>
-              </a:rPr>
-              <a:t>, </a:t>
-            </a:r>
-          </a:p>
-          <a:p>
-            <a:r>
-              <a:rPr lang="pl-PL" b="0" dirty="0" err="1">
-                <a:solidFill>
-                  <a:srgbClr val="000000"/>
-                </a:solidFill>
-                <a:latin typeface="Menlo"/>
-              </a:rPr>
-              <a:t>label</a:t>
-            </a:r>
-            <a:r>
-              <a:rPr lang="pl-PL" b="0" dirty="0">
-                <a:solidFill>
-                  <a:srgbClr val="000000"/>
-                </a:solidFill>
-                <a:latin typeface="Menlo"/>
-              </a:rPr>
-              <a:t> = </a:t>
-            </a:r>
-            <a:r>
-              <a:rPr lang="pl-PL" b="0" dirty="0" err="1">
-                <a:solidFill>
-                  <a:srgbClr val="000000"/>
-                </a:solidFill>
-                <a:latin typeface="Menlo"/>
-              </a:rPr>
-              <a:t>dt_HR</a:t>
-            </a:r>
-            <a:r>
-              <a:rPr lang="pl-PL" b="0" dirty="0">
-                <a:solidFill>
-                  <a:srgbClr val="000000"/>
-                </a:solidFill>
-                <a:latin typeface="Menlo"/>
-              </a:rPr>
-              <a:t>[, </a:t>
-            </a:r>
-            <a:r>
-              <a:rPr lang="pl-PL" b="0" dirty="0" err="1">
-                <a:solidFill>
-                  <a:srgbClr val="000000"/>
-                </a:solidFill>
-                <a:latin typeface="Menlo"/>
-              </a:rPr>
-              <a:t>left</a:t>
-            </a:r>
-            <a:r>
-              <a:rPr lang="pl-PL" b="0" dirty="0">
-                <a:solidFill>
-                  <a:srgbClr val="000000"/>
-                </a:solidFill>
-                <a:latin typeface="Menlo"/>
-              </a:rPr>
-              <a:t>] == 1, </a:t>
-            </a:r>
-            <a:r>
-              <a:rPr lang="pl-PL" b="0" dirty="0" err="1">
-                <a:solidFill>
-                  <a:srgbClr val="000000"/>
-                </a:solidFill>
-                <a:latin typeface="Menlo"/>
-              </a:rPr>
-              <a:t>nrounds</a:t>
-            </a:r>
-            <a:r>
-              <a:rPr lang="pl-PL" b="0" dirty="0">
-                <a:solidFill>
-                  <a:srgbClr val="000000"/>
-                </a:solidFill>
-                <a:latin typeface="Menlo"/>
-              </a:rPr>
-              <a:t> = 50, </a:t>
-            </a:r>
-            <a:r>
-              <a:rPr lang="pl-PL" b="0" dirty="0" err="1">
-                <a:solidFill>
-                  <a:srgbClr val="000000"/>
-                </a:solidFill>
-                <a:latin typeface="Menlo"/>
-              </a:rPr>
-              <a:t>verbose</a:t>
-            </a:r>
-            <a:r>
-              <a:rPr lang="pl-PL" b="0" dirty="0">
-                <a:solidFill>
-                  <a:srgbClr val="000000"/>
-                </a:solidFill>
-                <a:latin typeface="Menlo"/>
-              </a:rPr>
-              <a:t> = FALSE)</a:t>
+              <a:t> = 50)</a:t>
             </a:r>
           </a:p>
         </p:txBody>
@@ -7634,7 +7520,7 @@
                 </a:solidFill>
                 <a:latin typeface="Menlo"/>
               </a:rPr>
-              <a:t>EIX_lollipop</a:t>
+              <a:t>lollipop</a:t>
             </a:r>
             <a:r>
               <a:rPr lang="pl-PL" b="0" dirty="0">
@@ -7883,16 +7769,16 @@
               <a:t> &lt;- </a:t>
             </a:r>
             <a:r>
-              <a:rPr lang="en-US" dirty="0" err="1">
-                <a:solidFill>
-                  <a:srgbClr val="000000"/>
-                </a:solidFill>
-                <a:latin typeface="Menlo"/>
-              </a:rPr>
-              <a:t>EIX_waterfallPlot</a:t>
-            </a:r>
-            <a:r>
-              <a:rPr lang="en-US" b="0" dirty="0">
+              <a:rPr lang="en-US" dirty="0">
+                <a:solidFill>
+                  <a:srgbClr val="000000"/>
+                </a:solidFill>
+                <a:latin typeface="Menlo"/>
+              </a:rPr>
+              <a:t>waterfall</a:t>
+            </a:r>
+            <a:r>
+              <a:rPr lang="pl-PL" b="0" dirty="0">
                 <a:solidFill>
                   <a:srgbClr val="000000"/>
                 </a:solidFill>
@@ -8066,7 +7952,7 @@
                 </a:solidFill>
                 <a:latin typeface="Menlo"/>
               </a:rPr>
-              <a:t>interactionsTable</a:t>
+              <a:t>interactions</a:t>
             </a:r>
             <a:r>
               <a:rPr lang="fr-FR" b="0" dirty="0">
@@ -8352,13 +8238,13 @@
               <a:t>imp &lt;- </a:t>
             </a:r>
             <a:r>
-              <a:rPr lang="en-US" dirty="0" err="1">
-                <a:solidFill>
-                  <a:srgbClr val="000000"/>
-                </a:solidFill>
-                <a:latin typeface="Menlo"/>
-              </a:rPr>
-              <a:t>importanceTable</a:t>
+              <a:rPr lang="en-US" dirty="0">
+                <a:solidFill>
+                  <a:srgbClr val="000000"/>
+                </a:solidFill>
+                <a:latin typeface="Menlo"/>
+              </a:rPr>
+              <a:t>importance</a:t>
             </a:r>
             <a:r>
               <a:rPr lang="en-US" b="0" dirty="0">
@@ -9412,7 +9298,7 @@
           </a:ln>
           <a:extLst>
             <a:ext uri="{C572A759-6A51-4108-AA02-DFA0A04FC94B}">
-              <ma14:wrappingTextBoxFlag xmlns:lc="http://schemas.openxmlformats.org/drawingml/2006/lockedCanvas" xmlns:ma14="http://schemas.microsoft.com/office/mac/drawingml/2011/main" xmlns:a14="http://schemas.microsoft.com/office/drawing/2010/main" xmlns:m="http://schemas.openxmlformats.org/officeDocument/2006/math" xmlns="" val="1"/>
+              <ma14:wrappingTextBoxFlag xmlns="" xmlns:m="http://schemas.openxmlformats.org/officeDocument/2006/math" xmlns:a14="http://schemas.microsoft.com/office/drawing/2010/main" xmlns:ma14="http://schemas.microsoft.com/office/mac/drawingml/2011/main" xmlns:lc="http://schemas.openxmlformats.org/drawingml/2006/lockedCanvas" val="1"/>
             </a:ext>
           </a:extLst>
         </p:spPr>

</xml_diff>